<commit_message>
Fix a typo in DEMO 4 presentaion
</commit_message>
<xml_diff>
--- a/resources/documents/Demos/DEMO4 - Final Presentation.pptx
+++ b/resources/documents/Demos/DEMO4 - Final Presentation.pptx
@@ -233,7 +233,7 @@
           <a:p>
             <a:fld id="{C59259A2-7A12-3645-B048-AF41C849570F}" type="datetimeFigureOut">
               <a:rPr lang="en-IL" smtClean="0"/>
-              <a:t>05/22/2021</a:t>
+              <a:t>23/05/2021</a:t>
             </a:fld>
             <a:endParaRPr lang="en-IL"/>
           </a:p>
@@ -1490,7 +1490,7 @@
           <a:p>
             <a:fld id="{0027EE88-E9BF-9140-9863-3D07563D0701}" type="datetimeFigureOut">
               <a:rPr lang="en-IL" smtClean="0"/>
-              <a:t>05/22/2021</a:t>
+              <a:t>23/05/2021</a:t>
             </a:fld>
             <a:endParaRPr lang="en-IL"/>
           </a:p>
@@ -1690,7 +1690,7 @@
           <a:p>
             <a:fld id="{0027EE88-E9BF-9140-9863-3D07563D0701}" type="datetimeFigureOut">
               <a:rPr lang="en-IL" smtClean="0"/>
-              <a:t>05/22/2021</a:t>
+              <a:t>23/05/2021</a:t>
             </a:fld>
             <a:endParaRPr lang="en-IL"/>
           </a:p>
@@ -1900,7 +1900,7 @@
           <a:p>
             <a:fld id="{0027EE88-E9BF-9140-9863-3D07563D0701}" type="datetimeFigureOut">
               <a:rPr lang="en-IL" smtClean="0"/>
-              <a:t>05/22/2021</a:t>
+              <a:t>23/05/2021</a:t>
             </a:fld>
             <a:endParaRPr lang="en-IL"/>
           </a:p>
@@ -2100,7 +2100,7 @@
           <a:p>
             <a:fld id="{0027EE88-E9BF-9140-9863-3D07563D0701}" type="datetimeFigureOut">
               <a:rPr lang="en-IL" smtClean="0"/>
-              <a:t>05/22/2021</a:t>
+              <a:t>23/05/2021</a:t>
             </a:fld>
             <a:endParaRPr lang="en-IL"/>
           </a:p>
@@ -2376,7 +2376,7 @@
           <a:p>
             <a:fld id="{0027EE88-E9BF-9140-9863-3D07563D0701}" type="datetimeFigureOut">
               <a:rPr lang="en-IL" smtClean="0"/>
-              <a:t>05/22/2021</a:t>
+              <a:t>23/05/2021</a:t>
             </a:fld>
             <a:endParaRPr lang="en-IL"/>
           </a:p>
@@ -2644,7 +2644,7 @@
           <a:p>
             <a:fld id="{0027EE88-E9BF-9140-9863-3D07563D0701}" type="datetimeFigureOut">
               <a:rPr lang="en-IL" smtClean="0"/>
-              <a:t>05/22/2021</a:t>
+              <a:t>23/05/2021</a:t>
             </a:fld>
             <a:endParaRPr lang="en-IL"/>
           </a:p>
@@ -3059,7 +3059,7 @@
           <a:p>
             <a:fld id="{0027EE88-E9BF-9140-9863-3D07563D0701}" type="datetimeFigureOut">
               <a:rPr lang="en-IL" smtClean="0"/>
-              <a:t>05/22/2021</a:t>
+              <a:t>23/05/2021</a:t>
             </a:fld>
             <a:endParaRPr lang="en-IL"/>
           </a:p>
@@ -3201,7 +3201,7 @@
           <a:p>
             <a:fld id="{0027EE88-E9BF-9140-9863-3D07563D0701}" type="datetimeFigureOut">
               <a:rPr lang="en-IL" smtClean="0"/>
-              <a:t>05/22/2021</a:t>
+              <a:t>23/05/2021</a:t>
             </a:fld>
             <a:endParaRPr lang="en-IL"/>
           </a:p>
@@ -3314,7 +3314,7 @@
           <a:p>
             <a:fld id="{0027EE88-E9BF-9140-9863-3D07563D0701}" type="datetimeFigureOut">
               <a:rPr lang="en-IL" smtClean="0"/>
-              <a:t>05/22/2021</a:t>
+              <a:t>23/05/2021</a:t>
             </a:fld>
             <a:endParaRPr lang="en-IL"/>
           </a:p>
@@ -3627,7 +3627,7 @@
           <a:p>
             <a:fld id="{0027EE88-E9BF-9140-9863-3D07563D0701}" type="datetimeFigureOut">
               <a:rPr lang="en-IL" smtClean="0"/>
-              <a:t>05/22/2021</a:t>
+              <a:t>23/05/2021</a:t>
             </a:fld>
             <a:endParaRPr lang="en-IL"/>
           </a:p>
@@ -3916,7 +3916,7 @@
           <a:p>
             <a:fld id="{0027EE88-E9BF-9140-9863-3D07563D0701}" type="datetimeFigureOut">
               <a:rPr lang="en-IL" smtClean="0"/>
-              <a:t>05/22/2021</a:t>
+              <a:t>23/05/2021</a:t>
             </a:fld>
             <a:endParaRPr lang="en-IL"/>
           </a:p>
@@ -4159,7 +4159,7 @@
           <a:p>
             <a:fld id="{0027EE88-E9BF-9140-9863-3D07563D0701}" type="datetimeFigureOut">
               <a:rPr lang="en-IL" smtClean="0"/>
-              <a:t>05/22/2021</a:t>
+              <a:t>23/05/2021</a:t>
             </a:fld>
             <a:endParaRPr lang="en-IL"/>
           </a:p>
@@ -6888,13 +6888,22 @@
           <a:p>
             <a:pPr algn="ctr"/>
             <a:r>
-              <a:rPr lang="en-US" sz="2400" b="1" dirty="0">
+              <a:rPr lang="en-US" sz="2400" b="1">
                 <a:solidFill>
                   <a:schemeClr val="bg1"/>
                 </a:solidFill>
                 <a:latin typeface="Nexa Light" panose="02000000000000000000" pitchFamily="2" charset="0"/>
               </a:rPr>
-              <a:t>Tami Houri</a:t>
+              <a:t>Tamir </a:t>
+            </a:r>
+            <a:r>
+              <a:rPr lang="en-US" sz="2400" b="1" dirty="0">
+                <a:solidFill>
+                  <a:schemeClr val="bg1"/>
+                </a:solidFill>
+                <a:latin typeface="Nexa Light" panose="02000000000000000000" pitchFamily="2" charset="0"/>
+              </a:rPr>
+              <a:t>Houri</a:t>
             </a:r>
             <a:endParaRPr lang="en-IL" sz="2400" b="1" dirty="0">
               <a:solidFill>

</xml_diff>